<commit_message>
update to PPT and Rmd
</commit_message>
<xml_diff>
--- a/Presentation1.pptx
+++ b/Presentation1.pptx
@@ -1332,7 +1332,6 @@
           </c:extLst>
         </c:ser>
         <c:dLbls>
-          <c:dLblPos val="outEnd"/>
           <c:showLegendKey val="0"/>
           <c:showVal val="0"/>
           <c:showCatName val="0"/>
@@ -2023,7 +2022,6 @@
           </c:extLst>
         </c:ser>
         <c:dLbls>
-          <c:dLblPos val="outEnd"/>
           <c:showLegendKey val="0"/>
           <c:showVal val="0"/>
           <c:showCatName val="0"/>
@@ -4578,15 +4576,15 @@
       </dgm:t>
     </dgm:pt>
     <dgm:pt modelId="{6469E867-D79D-4CFF-9E23-4016522243E2}">
-      <dgm:prSet phldrT="[Text]"/>
+      <dgm:prSet phldrT="[Text]" custT="1"/>
       <dgm:spPr/>
       <dgm:t>
         <a:bodyPr/>
         <a:lstStyle/>
         <a:p>
           <a:r>
-            <a:rPr lang="en-US" dirty="0"/>
-            <a:t>60</a:t>
+            <a:rPr lang="en-US" sz="3200" dirty="0"/>
+            <a:t>62</a:t>
           </a:r>
         </a:p>
       </dgm:t>
@@ -4650,14 +4648,14 @@
       </dgm:t>
     </dgm:pt>
     <dgm:pt modelId="{9D0EF9EF-D72D-487A-90FD-91E49FA96B09}">
-      <dgm:prSet phldrT="[Text]"/>
+      <dgm:prSet phldrT="[Text]" custT="1"/>
       <dgm:spPr/>
       <dgm:t>
         <a:bodyPr/>
         <a:lstStyle/>
         <a:p>
           <a:r>
-            <a:rPr lang="en-US" dirty="0"/>
+            <a:rPr lang="en-US" sz="3200" dirty="0"/>
             <a:t>1005</a:t>
           </a:r>
         </a:p>
@@ -4722,16 +4720,17 @@
       </dgm:t>
     </dgm:pt>
     <dgm:pt modelId="{7BC3BECF-F222-45B5-A8BF-684094316992}">
-      <dgm:prSet phldrT="[Text]"/>
+      <dgm:prSet phldrT="[Text]" custT="1"/>
       <dgm:spPr/>
       <dgm:t>
         <a:bodyPr/>
         <a:lstStyle/>
         <a:p>
           <a:r>
-            <a:rPr lang="en-US" dirty="0"/>
+            <a:rPr lang="en-US" sz="3200" dirty="0"/>
             <a:t>5</a:t>
           </a:r>
+          <a:endParaRPr lang="en-US" sz="4500" dirty="0"/>
         </a:p>
       </dgm:t>
     </dgm:pt>
@@ -4756,50 +4755,6 @@
           <a:endParaRPr lang="en-US"/>
         </a:p>
       </dgm:t>
-    </dgm:pt>
-    <dgm:pt modelId="{61F9C07E-3AFA-492D-A9B8-82008226FB3A}">
-      <dgm:prSet phldrT="[Text]"/>
-      <dgm:spPr/>
-      <dgm:t>
-        <a:bodyPr/>
-        <a:lstStyle/>
-        <a:p>
-          <a:r>
-            <a:rPr lang="en-US" dirty="0"/>
-            <a:t>Does not include UT = Zero – need clarification on whether this is an NA</a:t>
-          </a:r>
-        </a:p>
-      </dgm:t>
-    </dgm:pt>
-    <dgm:pt modelId="{4C94B943-8C3F-4A20-B836-84B4353B77AB}" type="parTrans" cxnId="{6A8BAAC3-3434-468F-9E88-4C56FFF59E67}">
-      <dgm:prSet/>
-      <dgm:spPr/>
-    </dgm:pt>
-    <dgm:pt modelId="{5596B5B1-3B9A-4738-9292-4F5EAB384992}" type="sibTrans" cxnId="{6A8BAAC3-3434-468F-9E88-4C56FFF59E67}">
-      <dgm:prSet/>
-      <dgm:spPr/>
-    </dgm:pt>
-    <dgm:pt modelId="{E2E90C70-2A05-4B53-B72D-E95E3A87FA10}">
-      <dgm:prSet phldrT="[Text]"/>
-      <dgm:spPr/>
-      <dgm:t>
-        <a:bodyPr/>
-        <a:lstStyle/>
-        <a:p>
-          <a:r>
-            <a:rPr lang="en-US" dirty="0"/>
-            <a:t>SD has NA in field for IBU – need clarification </a:t>
-          </a:r>
-        </a:p>
-      </dgm:t>
-    </dgm:pt>
-    <dgm:pt modelId="{2F03A0B5-7F9A-463B-9094-7F43674C73B7}" type="parTrans" cxnId="{7152C502-3926-4776-A14F-7802AD84F9F8}">
-      <dgm:prSet/>
-      <dgm:spPr/>
-    </dgm:pt>
-    <dgm:pt modelId="{DDF7E8F3-BF5E-4ACA-9F48-9F497DDA2C1C}" type="sibTrans" cxnId="{7152C502-3926-4776-A14F-7802AD84F9F8}">
-      <dgm:prSet/>
-      <dgm:spPr/>
     </dgm:pt>
     <dgm:pt modelId="{E09DFE11-1C3D-4591-A016-4B5C25E87158}" type="pres">
       <dgm:prSet presAssocID="{245F8F0F-550B-4F8D-B037-B287FC9D15AE}" presName="Name0" presStyleCnt="0">
@@ -4887,19 +4842,15 @@
     </dgm:pt>
   </dgm:ptLst>
   <dgm:cxnLst>
-    <dgm:cxn modelId="{7152C502-3926-4776-A14F-7802AD84F9F8}" srcId="{694FC7AF-9976-448A-8228-01ADD93FE7B5}" destId="{E2E90C70-2A05-4B53-B72D-E95E3A87FA10}" srcOrd="1" destOrd="0" parTransId="{2F03A0B5-7F9A-463B-9094-7F43674C73B7}" sibTransId="{DDF7E8F3-BF5E-4ACA-9F48-9F497DDA2C1C}"/>
     <dgm:cxn modelId="{12CD9804-9A5B-464D-AC80-8A7120A19192}" srcId="{245F8F0F-550B-4F8D-B037-B287FC9D15AE}" destId="{694FC7AF-9976-448A-8228-01ADD93FE7B5}" srcOrd="1" destOrd="0" parTransId="{E8346180-698B-4DBC-B8C1-9171F566C09C}" sibTransId="{722F478F-CA2B-4C0D-ADAC-E9EA4D512BD3}"/>
     <dgm:cxn modelId="{452DD11B-BAC7-4CEF-B88F-B4DE154F446C}" type="presOf" srcId="{11DDEDBE-6B6F-4CE3-AFFA-3AEBE049C858}" destId="{9E2A49D3-69A8-448D-8BA6-CCE43F12B670}" srcOrd="0" destOrd="0" presId="urn:microsoft.com/office/officeart/2005/8/layout/hList1"/>
     <dgm:cxn modelId="{00150232-717A-475E-B147-F6F9A95A24A3}" srcId="{1B18270E-0FF6-41C1-9F6B-F87222DE59ED}" destId="{7BC3BECF-F222-45B5-A8BF-684094316992}" srcOrd="0" destOrd="0" parTransId="{F5C7A998-01FA-4A1C-9599-883C2FD848FB}" sibTransId="{CBC8E4C4-7FCE-4E4D-A38D-09232DB0CEC3}"/>
-    <dgm:cxn modelId="{16F58B60-DCC1-4E4A-A27C-43A6AB16BE4C}" type="presOf" srcId="{61F9C07E-3AFA-492D-A9B8-82008226FB3A}" destId="{53589A88-8D73-47B6-82BC-40710CC9D801}" srcOrd="0" destOrd="1" presId="urn:microsoft.com/office/officeart/2005/8/layout/hList1"/>
     <dgm:cxn modelId="{F7144567-D5E0-4664-80E3-09AD1CBE7C94}" type="presOf" srcId="{694FC7AF-9976-448A-8228-01ADD93FE7B5}" destId="{DDD4128C-289F-404B-A6E6-BCDB7834D96D}" srcOrd="0" destOrd="0" presId="urn:microsoft.com/office/officeart/2005/8/layout/hList1"/>
     <dgm:cxn modelId="{A1726B7B-8B6A-482A-B1E5-FF9D8E89BA17}" srcId="{694FC7AF-9976-448A-8228-01ADD93FE7B5}" destId="{9D0EF9EF-D72D-487A-90FD-91E49FA96B09}" srcOrd="0" destOrd="0" parTransId="{D6091939-1122-4CD3-96E3-99AB171223A5}" sibTransId="{C2C1A0CA-B183-402B-BA4B-4CBF4869A06E}"/>
     <dgm:cxn modelId="{C45B0980-28E1-40E9-AF78-7CE61BC1214B}" srcId="{245F8F0F-550B-4F8D-B037-B287FC9D15AE}" destId="{11DDEDBE-6B6F-4CE3-AFFA-3AEBE049C858}" srcOrd="0" destOrd="0" parTransId="{1F5C81C6-117F-4BDB-908B-8E38CF13C431}" sibTransId="{51E37AEF-6C0E-40DA-8A2F-90360CC0B372}"/>
     <dgm:cxn modelId="{F600C195-5681-49D3-9796-BE21BA2849AC}" srcId="{245F8F0F-550B-4F8D-B037-B287FC9D15AE}" destId="{1B18270E-0FF6-41C1-9F6B-F87222DE59ED}" srcOrd="2" destOrd="0" parTransId="{429101F9-C237-412E-8BDB-B9367FBA4073}" sibTransId="{7D112269-169F-48C2-8CD2-8921A999784B}"/>
     <dgm:cxn modelId="{43784CA8-3ACD-4600-B7A6-003E744C3E24}" srcId="{11DDEDBE-6B6F-4CE3-AFFA-3AEBE049C858}" destId="{6469E867-D79D-4CFF-9E23-4016522243E2}" srcOrd="0" destOrd="0" parTransId="{E973AB02-BB59-437C-8A76-34FE1E8BE60B}" sibTransId="{035F2FFE-FFC5-4320-AC39-C4AEE5F04E3C}"/>
-    <dgm:cxn modelId="{15A9F0B2-9AC0-4593-A79C-DB354E2F739C}" type="presOf" srcId="{E2E90C70-2A05-4B53-B72D-E95E3A87FA10}" destId="{3991200B-1FC9-4DA7-9939-B1A2BEB25201}" srcOrd="0" destOrd="1" presId="urn:microsoft.com/office/officeart/2005/8/layout/hList1"/>
     <dgm:cxn modelId="{FE08C7BE-F15A-4272-9A38-CEEA70CBAD1B}" type="presOf" srcId="{7BC3BECF-F222-45B5-A8BF-684094316992}" destId="{BA89DA29-94E9-43E5-859F-1A126526C90A}" srcOrd="0" destOrd="0" presId="urn:microsoft.com/office/officeart/2005/8/layout/hList1"/>
-    <dgm:cxn modelId="{6A8BAAC3-3434-468F-9E88-4C56FFF59E67}" srcId="{11DDEDBE-6B6F-4CE3-AFFA-3AEBE049C858}" destId="{61F9C07E-3AFA-492D-A9B8-82008226FB3A}" srcOrd="1" destOrd="0" parTransId="{4C94B943-8C3F-4A20-B836-84B4353B77AB}" sibTransId="{5596B5B1-3B9A-4738-9292-4F5EAB384992}"/>
     <dgm:cxn modelId="{E53E45CA-305D-4F93-8954-987F74898BA3}" type="presOf" srcId="{245F8F0F-550B-4F8D-B037-B287FC9D15AE}" destId="{E09DFE11-1C3D-4591-A016-4B5C25E87158}" srcOrd="0" destOrd="0" presId="urn:microsoft.com/office/officeart/2005/8/layout/hList1"/>
     <dgm:cxn modelId="{FC5E11E3-50C2-4401-B5EC-038D3662C952}" type="presOf" srcId="{9D0EF9EF-D72D-487A-90FD-91E49FA96B09}" destId="{3991200B-1FC9-4DA7-9939-B1A2BEB25201}" srcOrd="0" destOrd="0" presId="urn:microsoft.com/office/officeart/2005/8/layout/hList1"/>
     <dgm:cxn modelId="{215E00E4-F80B-4C2F-85F8-C5E57B6C96DA}" type="presOf" srcId="{6469E867-D79D-4CFF-9E23-4016522243E2}" destId="{53589A88-8D73-47B6-82BC-40710CC9D801}" srcOrd="0" destOrd="0" presId="urn:microsoft.com/office/officeart/2005/8/layout/hList1"/>
@@ -4941,8 +4892,8 @@
       </dsp:nvSpPr>
       <dsp:spPr>
         <a:xfrm>
-          <a:off x="2540" y="430601"/>
-          <a:ext cx="2476500" cy="777600"/>
+          <a:off x="2540" y="177035"/>
+          <a:ext cx="2476500" cy="990600"/>
         </a:xfrm>
         <a:prstGeom prst="rect">
           <a:avLst/>
@@ -4983,12 +4934,12 @@
         </a:fontRef>
       </dsp:style>
       <dsp:txBody>
-        <a:bodyPr spcFirstLastPara="0" vert="horz" wrap="square" lIns="192024" tIns="109728" rIns="192024" bIns="109728" numCol="1" spcCol="1270" anchor="ctr" anchorCtr="0">
+        <a:bodyPr spcFirstLastPara="0" vert="horz" wrap="square" lIns="320040" tIns="182880" rIns="320040" bIns="182880" numCol="1" spcCol="1270" anchor="ctr" anchorCtr="0">
           <a:noAutofit/>
         </a:bodyPr>
         <a:lstStyle/>
         <a:p>
-          <a:pPr marL="0" lvl="0" indent="0" algn="ctr" defTabSz="1200150">
+          <a:pPr marL="0" lvl="0" indent="0" algn="ctr" defTabSz="2000250">
             <a:lnSpc>
               <a:spcPct val="90000"/>
             </a:lnSpc>
@@ -5001,14 +4952,14 @@
             <a:buNone/>
           </a:pPr>
           <a:r>
-            <a:rPr lang="en-US" sz="2700" kern="1200" dirty="0"/>
+            <a:rPr lang="en-US" sz="4500" kern="1200" dirty="0"/>
             <a:t>ABV</a:t>
           </a:r>
         </a:p>
       </dsp:txBody>
       <dsp:txXfrm>
-        <a:off x="2540" y="430601"/>
-        <a:ext cx="2476500" cy="777600"/>
+        <a:off x="2540" y="177035"/>
+        <a:ext cx="2476500" cy="990600"/>
       </dsp:txXfrm>
     </dsp:sp>
     <dsp:sp modelId="{53589A88-8D73-47B6-82BC-40710CC9D801}">
@@ -5018,8 +4969,8 @@
       </dsp:nvSpPr>
       <dsp:spPr>
         <a:xfrm>
-          <a:off x="2540" y="1208201"/>
-          <a:ext cx="2476500" cy="3779865"/>
+          <a:off x="2540" y="1167635"/>
+          <a:ext cx="2476500" cy="1976400"/>
         </a:xfrm>
         <a:prstGeom prst="rect">
           <a:avLst/>
@@ -5062,12 +5013,12 @@
         <a:fontRef idx="minor"/>
       </dsp:style>
       <dsp:txBody>
-        <a:bodyPr spcFirstLastPara="0" vert="horz" wrap="square" lIns="144018" tIns="144018" rIns="192024" bIns="216027" numCol="1" spcCol="1270" anchor="t" anchorCtr="0">
+        <a:bodyPr spcFirstLastPara="0" vert="horz" wrap="square" lIns="170688" tIns="170688" rIns="227584" bIns="256032" numCol="1" spcCol="1270" anchor="t" anchorCtr="0">
           <a:noAutofit/>
         </a:bodyPr>
         <a:lstStyle/>
         <a:p>
-          <a:pPr marL="228600" lvl="1" indent="-228600" algn="l" defTabSz="1200150">
+          <a:pPr marL="285750" lvl="1" indent="-285750" algn="l" defTabSz="1422400">
             <a:lnSpc>
               <a:spcPct val="90000"/>
             </a:lnSpc>
@@ -5080,32 +5031,14 @@
             <a:buChar char="•"/>
           </a:pPr>
           <a:r>
-            <a:rPr lang="en-US" sz="2700" kern="1200" dirty="0"/>
-            <a:t>60</a:t>
-          </a:r>
-        </a:p>
-        <a:p>
-          <a:pPr marL="228600" lvl="1" indent="-228600" algn="l" defTabSz="1200150">
-            <a:lnSpc>
-              <a:spcPct val="90000"/>
-            </a:lnSpc>
-            <a:spcBef>
-              <a:spcPct val="0"/>
-            </a:spcBef>
-            <a:spcAft>
-              <a:spcPct val="15000"/>
-            </a:spcAft>
-            <a:buChar char="•"/>
-          </a:pPr>
-          <a:r>
-            <a:rPr lang="en-US" sz="2700" kern="1200" dirty="0"/>
-            <a:t>Does not include UT = Zero – need clarification on whether this is an NA</a:t>
+            <a:rPr lang="en-US" sz="3200" kern="1200" dirty="0"/>
+            <a:t>62</a:t>
           </a:r>
         </a:p>
       </dsp:txBody>
       <dsp:txXfrm>
-        <a:off x="2540" y="1208201"/>
-        <a:ext cx="2476500" cy="3779865"/>
+        <a:off x="2540" y="1167635"/>
+        <a:ext cx="2476500" cy="1976400"/>
       </dsp:txXfrm>
     </dsp:sp>
     <dsp:sp modelId="{DDD4128C-289F-404B-A6E6-BCDB7834D96D}">
@@ -5115,8 +5048,8 @@
       </dsp:nvSpPr>
       <dsp:spPr>
         <a:xfrm>
-          <a:off x="2825750" y="430601"/>
-          <a:ext cx="2476500" cy="777600"/>
+          <a:off x="2825750" y="177035"/>
+          <a:ext cx="2476500" cy="990600"/>
         </a:xfrm>
         <a:prstGeom prst="rect">
           <a:avLst/>
@@ -5157,12 +5090,12 @@
         </a:fontRef>
       </dsp:style>
       <dsp:txBody>
-        <a:bodyPr spcFirstLastPara="0" vert="horz" wrap="square" lIns="192024" tIns="109728" rIns="192024" bIns="109728" numCol="1" spcCol="1270" anchor="ctr" anchorCtr="0">
+        <a:bodyPr spcFirstLastPara="0" vert="horz" wrap="square" lIns="320040" tIns="182880" rIns="320040" bIns="182880" numCol="1" spcCol="1270" anchor="ctr" anchorCtr="0">
           <a:noAutofit/>
         </a:bodyPr>
         <a:lstStyle/>
         <a:p>
-          <a:pPr marL="0" lvl="0" indent="0" algn="ctr" defTabSz="1200150">
+          <a:pPr marL="0" lvl="0" indent="0" algn="ctr" defTabSz="2000250">
             <a:lnSpc>
               <a:spcPct val="90000"/>
             </a:lnSpc>
@@ -5175,14 +5108,14 @@
             <a:buNone/>
           </a:pPr>
           <a:r>
-            <a:rPr lang="en-US" sz="2700" kern="1200" dirty="0"/>
+            <a:rPr lang="en-US" sz="4500" kern="1200" dirty="0"/>
             <a:t>IBU</a:t>
           </a:r>
         </a:p>
       </dsp:txBody>
       <dsp:txXfrm>
-        <a:off x="2825750" y="430601"/>
-        <a:ext cx="2476500" cy="777600"/>
+        <a:off x="2825750" y="177035"/>
+        <a:ext cx="2476500" cy="990600"/>
       </dsp:txXfrm>
     </dsp:sp>
     <dsp:sp modelId="{3991200B-1FC9-4DA7-9939-B1A2BEB25201}">
@@ -5192,8 +5125,8 @@
       </dsp:nvSpPr>
       <dsp:spPr>
         <a:xfrm>
-          <a:off x="2825750" y="1208201"/>
-          <a:ext cx="2476500" cy="3779865"/>
+          <a:off x="2825750" y="1167635"/>
+          <a:ext cx="2476500" cy="1976400"/>
         </a:xfrm>
         <a:prstGeom prst="rect">
           <a:avLst/>
@@ -5236,12 +5169,12 @@
         <a:fontRef idx="minor"/>
       </dsp:style>
       <dsp:txBody>
-        <a:bodyPr spcFirstLastPara="0" vert="horz" wrap="square" lIns="144018" tIns="144018" rIns="192024" bIns="216027" numCol="1" spcCol="1270" anchor="t" anchorCtr="0">
+        <a:bodyPr spcFirstLastPara="0" vert="horz" wrap="square" lIns="170688" tIns="170688" rIns="227584" bIns="256032" numCol="1" spcCol="1270" anchor="t" anchorCtr="0">
           <a:noAutofit/>
         </a:bodyPr>
         <a:lstStyle/>
         <a:p>
-          <a:pPr marL="228600" lvl="1" indent="-228600" algn="l" defTabSz="1200150">
+          <a:pPr marL="285750" lvl="1" indent="-285750" algn="l" defTabSz="1422400">
             <a:lnSpc>
               <a:spcPct val="90000"/>
             </a:lnSpc>
@@ -5254,32 +5187,14 @@
             <a:buChar char="•"/>
           </a:pPr>
           <a:r>
-            <a:rPr lang="en-US" sz="2700" kern="1200" dirty="0"/>
+            <a:rPr lang="en-US" sz="3200" kern="1200" dirty="0"/>
             <a:t>1005</a:t>
-          </a:r>
-        </a:p>
-        <a:p>
-          <a:pPr marL="228600" lvl="1" indent="-228600" algn="l" defTabSz="1200150">
-            <a:lnSpc>
-              <a:spcPct val="90000"/>
-            </a:lnSpc>
-            <a:spcBef>
-              <a:spcPct val="0"/>
-            </a:spcBef>
-            <a:spcAft>
-              <a:spcPct val="15000"/>
-            </a:spcAft>
-            <a:buChar char="•"/>
-          </a:pPr>
-          <a:r>
-            <a:rPr lang="en-US" sz="2700" kern="1200" dirty="0"/>
-            <a:t>SD has NA in field for IBU – need clarification </a:t>
           </a:r>
         </a:p>
       </dsp:txBody>
       <dsp:txXfrm>
-        <a:off x="2825750" y="1208201"/>
-        <a:ext cx="2476500" cy="3779865"/>
+        <a:off x="2825750" y="1167635"/>
+        <a:ext cx="2476500" cy="1976400"/>
       </dsp:txXfrm>
     </dsp:sp>
     <dsp:sp modelId="{22A7B64B-B5A3-4014-A9FA-40F6270EC35B}">
@@ -5289,8 +5204,8 @@
       </dsp:nvSpPr>
       <dsp:spPr>
         <a:xfrm>
-          <a:off x="5648960" y="430601"/>
-          <a:ext cx="2476500" cy="777600"/>
+          <a:off x="5648960" y="177035"/>
+          <a:ext cx="2476500" cy="990600"/>
         </a:xfrm>
         <a:prstGeom prst="rect">
           <a:avLst/>
@@ -5331,12 +5246,12 @@
         </a:fontRef>
       </dsp:style>
       <dsp:txBody>
-        <a:bodyPr spcFirstLastPara="0" vert="horz" wrap="square" lIns="192024" tIns="109728" rIns="192024" bIns="109728" numCol="1" spcCol="1270" anchor="ctr" anchorCtr="0">
+        <a:bodyPr spcFirstLastPara="0" vert="horz" wrap="square" lIns="320040" tIns="182880" rIns="320040" bIns="182880" numCol="1" spcCol="1270" anchor="ctr" anchorCtr="0">
           <a:noAutofit/>
         </a:bodyPr>
         <a:lstStyle/>
         <a:p>
-          <a:pPr marL="0" lvl="0" indent="0" algn="ctr" defTabSz="1200150">
+          <a:pPr marL="0" lvl="0" indent="0" algn="ctr" defTabSz="2000250">
             <a:lnSpc>
               <a:spcPct val="90000"/>
             </a:lnSpc>
@@ -5349,14 +5264,14 @@
             <a:buNone/>
           </a:pPr>
           <a:r>
-            <a:rPr lang="en-US" sz="2700" kern="1200" dirty="0"/>
+            <a:rPr lang="en-US" sz="4500" kern="1200" dirty="0"/>
             <a:t>Style</a:t>
           </a:r>
         </a:p>
       </dsp:txBody>
       <dsp:txXfrm>
-        <a:off x="5648960" y="430601"/>
-        <a:ext cx="2476500" cy="777600"/>
+        <a:off x="5648960" y="177035"/>
+        <a:ext cx="2476500" cy="990600"/>
       </dsp:txXfrm>
     </dsp:sp>
     <dsp:sp modelId="{BA89DA29-94E9-43E5-859F-1A126526C90A}">
@@ -5366,8 +5281,8 @@
       </dsp:nvSpPr>
       <dsp:spPr>
         <a:xfrm>
-          <a:off x="5648960" y="1208201"/>
-          <a:ext cx="2476500" cy="3779865"/>
+          <a:off x="5648960" y="1167635"/>
+          <a:ext cx="2476500" cy="1976400"/>
         </a:xfrm>
         <a:prstGeom prst="rect">
           <a:avLst/>
@@ -5410,12 +5325,12 @@
         <a:fontRef idx="minor"/>
       </dsp:style>
       <dsp:txBody>
-        <a:bodyPr spcFirstLastPara="0" vert="horz" wrap="square" lIns="144018" tIns="144018" rIns="192024" bIns="216027" numCol="1" spcCol="1270" anchor="t" anchorCtr="0">
+        <a:bodyPr spcFirstLastPara="0" vert="horz" wrap="square" lIns="170688" tIns="170688" rIns="227584" bIns="256032" numCol="1" spcCol="1270" anchor="t" anchorCtr="0">
           <a:noAutofit/>
         </a:bodyPr>
         <a:lstStyle/>
         <a:p>
-          <a:pPr marL="228600" lvl="1" indent="-228600" algn="l" defTabSz="1200150">
+          <a:pPr marL="285750" lvl="1" indent="-285750" algn="l" defTabSz="1422400">
             <a:lnSpc>
               <a:spcPct val="90000"/>
             </a:lnSpc>
@@ -5428,14 +5343,15 @@
             <a:buChar char="•"/>
           </a:pPr>
           <a:r>
-            <a:rPr lang="en-US" sz="2700" kern="1200" dirty="0"/>
+            <a:rPr lang="en-US" sz="3200" kern="1200" dirty="0"/>
             <a:t>5</a:t>
           </a:r>
+          <a:endParaRPr lang="en-US" sz="4500" kern="1200" dirty="0"/>
         </a:p>
       </dsp:txBody>
       <dsp:txXfrm>
-        <a:off x="5648960" y="1208201"/>
-        <a:ext cx="2476500" cy="3779865"/>
+        <a:off x="5648960" y="1167635"/>
+        <a:ext cx="2476500" cy="1976400"/>
       </dsp:txXfrm>
     </dsp:sp>
   </dsp:spTree>
@@ -6861,7 +6777,7 @@
           <a:p>
             <a:fld id="{F2F46701-6C5B-42CA-B80D-9AEFE275C2EF}" type="datetimeFigureOut">
               <a:rPr lang="en-US" smtClean="0"/>
-              <a:t>2/25/2018</a:t>
+              <a:t>2/26/2018</a:t>
             </a:fld>
             <a:endParaRPr lang="en-US"/>
           </a:p>
@@ -7089,7 +7005,7 @@
           <a:p>
             <a:fld id="{F2F46701-6C5B-42CA-B80D-9AEFE275C2EF}" type="datetimeFigureOut">
               <a:rPr lang="en-US" smtClean="0"/>
-              <a:t>2/25/2018</a:t>
+              <a:t>2/26/2018</a:t>
             </a:fld>
             <a:endParaRPr lang="en-US"/>
           </a:p>
@@ -7269,7 +7185,7 @@
           <a:p>
             <a:fld id="{F2F46701-6C5B-42CA-B80D-9AEFE275C2EF}" type="datetimeFigureOut">
               <a:rPr lang="en-US" smtClean="0"/>
-              <a:t>2/25/2018</a:t>
+              <a:t>2/26/2018</a:t>
             </a:fld>
             <a:endParaRPr lang="en-US"/>
           </a:p>
@@ -7439,7 +7355,7 @@
           <a:p>
             <a:fld id="{F2F46701-6C5B-42CA-B80D-9AEFE275C2EF}" type="datetimeFigureOut">
               <a:rPr lang="en-US" smtClean="0"/>
-              <a:t>2/25/2018</a:t>
+              <a:t>2/26/2018</a:t>
             </a:fld>
             <a:endParaRPr lang="en-US"/>
           </a:p>
@@ -7693,7 +7609,7 @@
           <a:p>
             <a:fld id="{F2F46701-6C5B-42CA-B80D-9AEFE275C2EF}" type="datetimeFigureOut">
               <a:rPr lang="en-US" smtClean="0"/>
-              <a:t>2/25/2018</a:t>
+              <a:t>2/26/2018</a:t>
             </a:fld>
             <a:endParaRPr lang="en-US"/>
           </a:p>
@@ -8019,7 +7935,7 @@
           <a:p>
             <a:fld id="{F2F46701-6C5B-42CA-B80D-9AEFE275C2EF}" type="datetimeFigureOut">
               <a:rPr lang="en-US" smtClean="0"/>
-              <a:t>2/25/2018</a:t>
+              <a:t>2/26/2018</a:t>
             </a:fld>
             <a:endParaRPr lang="en-US"/>
           </a:p>
@@ -8470,7 +8386,7 @@
           <a:p>
             <a:fld id="{F2F46701-6C5B-42CA-B80D-9AEFE275C2EF}" type="datetimeFigureOut">
               <a:rPr lang="en-US" smtClean="0"/>
-              <a:t>2/25/2018</a:t>
+              <a:t>2/26/2018</a:t>
             </a:fld>
             <a:endParaRPr lang="en-US"/>
           </a:p>
@@ -8588,7 +8504,7 @@
           <a:p>
             <a:fld id="{F2F46701-6C5B-42CA-B80D-9AEFE275C2EF}" type="datetimeFigureOut">
               <a:rPr lang="en-US" smtClean="0"/>
-              <a:t>2/25/2018</a:t>
+              <a:t>2/26/2018</a:t>
             </a:fld>
             <a:endParaRPr lang="en-US"/>
           </a:p>
@@ -8683,7 +8599,7 @@
           <a:p>
             <a:fld id="{F2F46701-6C5B-42CA-B80D-9AEFE275C2EF}" type="datetimeFigureOut">
               <a:rPr lang="en-US" smtClean="0"/>
-              <a:t>2/25/2018</a:t>
+              <a:t>2/26/2018</a:t>
             </a:fld>
             <a:endParaRPr lang="en-US"/>
           </a:p>
@@ -8970,7 +8886,7 @@
           <a:p>
             <a:fld id="{F2F46701-6C5B-42CA-B80D-9AEFE275C2EF}" type="datetimeFigureOut">
               <a:rPr lang="en-US" smtClean="0"/>
-              <a:t>2/25/2018</a:t>
+              <a:t>2/26/2018</a:t>
             </a:fld>
             <a:endParaRPr lang="en-US"/>
           </a:p>
@@ -9292,7 +9208,7 @@
           <a:p>
             <a:fld id="{F2F46701-6C5B-42CA-B80D-9AEFE275C2EF}" type="datetimeFigureOut">
               <a:rPr lang="en-US" smtClean="0"/>
-              <a:t>2/25/2018</a:t>
+              <a:t>2/26/2018</a:t>
             </a:fld>
             <a:endParaRPr lang="en-US"/>
           </a:p>
@@ -9546,7 +9462,7 @@
           <a:p>
             <a:fld id="{F2F46701-6C5B-42CA-B80D-9AEFE275C2EF}" type="datetimeFigureOut">
               <a:rPr lang="en-US" smtClean="0"/>
-              <a:t>2/25/2018</a:t>
+              <a:t>2/26/2018</a:t>
             </a:fld>
             <a:endParaRPr lang="en-US"/>
           </a:p>
@@ -12785,14 +12701,14 @@
           <p:nvPr>
             <p:extLst>
               <p:ext uri="{D42A27DB-BD31-4B8C-83A1-F6EECF244321}">
-                <p14:modId xmlns:p14="http://schemas.microsoft.com/office/powerpoint/2010/main" val="2656831542"/>
+                <p14:modId xmlns:p14="http://schemas.microsoft.com/office/powerpoint/2010/main" val="3869411753"/>
               </p:ext>
             </p:extLst>
           </p:nvPr>
         </p:nvGraphicFramePr>
         <p:xfrm>
-          <a:off x="1676768" y="780664"/>
-          <a:ext cx="8128000" cy="5418667"/>
+          <a:off x="1676768" y="1120299"/>
+          <a:ext cx="8128000" cy="3321072"/>
         </p:xfrm>
         <a:graphic>
           <a:graphicData uri="http://schemas.openxmlformats.org/drawingml/2006/diagram">
@@ -12800,6 +12716,38 @@
           </a:graphicData>
         </a:graphic>
       </p:graphicFrame>
+      <p:sp>
+        <p:nvSpPr>
+          <p:cNvPr id="4" name="TextBox 3">
+            <a:extLst>
+              <a:ext uri="{FF2B5EF4-FFF2-40B4-BE49-F238E27FC236}">
+                <a16:creationId xmlns:a16="http://schemas.microsoft.com/office/drawing/2014/main" id="{F5B68701-CF2D-4877-A237-9D823C7A0F8D}"/>
+              </a:ext>
+            </a:extLst>
+          </p:cNvPr>
+          <p:cNvSpPr txBox="1"/>
+          <p:nvPr/>
+        </p:nvSpPr>
+        <p:spPr>
+          <a:xfrm>
+            <a:off x="1219200" y="5050971"/>
+            <a:ext cx="184731" cy="369332"/>
+          </a:xfrm>
+          <a:prstGeom prst="rect">
+            <a:avLst/>
+          </a:prstGeom>
+          <a:noFill/>
+        </p:spPr>
+        <p:txBody>
+          <a:bodyPr wrap="none" rtlCol="0">
+            <a:spAutoFit/>
+          </a:bodyPr>
+          <a:lstStyle/>
+          <a:p>
+            <a:endParaRPr lang="en-US"/>
+          </a:p>
+        </p:txBody>
+      </p:sp>
     </p:spTree>
     <p:extLst>
       <p:ext uri="{BB962C8B-B14F-4D97-AF65-F5344CB8AC3E}">
@@ -13224,14 +13172,14 @@
             <p:ph sz="half" idx="1"/>
             <p:extLst>
               <p:ext uri="{D42A27DB-BD31-4B8C-83A1-F6EECF244321}">
-                <p14:modId xmlns:p14="http://schemas.microsoft.com/office/powerpoint/2010/main" val="3669519623"/>
+                <p14:modId xmlns:p14="http://schemas.microsoft.com/office/powerpoint/2010/main" val="4133471255"/>
               </p:ext>
             </p:extLst>
           </p:nvPr>
         </p:nvGraphicFramePr>
         <p:xfrm>
-          <a:off x="-1" y="838899"/>
-          <a:ext cx="11316021" cy="6107185"/>
+          <a:off x="-1" y="838900"/>
+          <a:ext cx="11316021" cy="5178724"/>
         </p:xfrm>
         <a:graphic>
           <a:graphicData uri="http://schemas.openxmlformats.org/drawingml/2006/chart">

</xml_diff>